<commit_message>
db layout, vendor/report forms updates
</commit_message>
<xml_diff>
--- a/docs/dbPlanning/db_layouts.pptx
+++ b/docs/dbPlanning/db_layouts.pptx
@@ -21,6 +21,7 @@
     <p:sldId id="270" r:id="rId15"/>
     <p:sldId id="271" r:id="rId16"/>
     <p:sldId id="272" r:id="rId17"/>
+    <p:sldId id="273" r:id="rId18"/>
   </p:sldIdLst>
   <p:sldSz cx="12192000" cy="6858000"/>
   <p:notesSz cx="6858000" cy="9144000"/>
@@ -132,6 +133,7 @@
   <p1510:revLst>
     <p1510:client id="{63524BE5-501D-4026-A598-AB0F4E0747AA}" v="3090" dt="2022-03-10T21:43:05.658"/>
     <p1510:client id="{B7183890-4794-35F4-F043-74670DCF3248}" v="3322" dt="2022-03-10T21:43:58.538"/>
+    <p1510:client id="{FC5AF628-2AFD-474B-9B40-A15C72CD4D3A}" v="261" dt="2022-04-04T17:10:33.086"/>
   </p1510:revLst>
 </p1510:revInfo>
 </file>
@@ -265,7 +267,7 @@
           <a:p>
             <a:fld id="{846CE7D5-CF57-46EF-B807-FDD0502418D4}" type="datetimeFigureOut">
               <a:rPr lang="en-US" smtClean="0"/>
-              <a:t>3/10/2022</a:t>
+              <a:t>4/4/2022</a:t>
             </a:fld>
             <a:endParaRPr lang="en-US"/>
           </a:p>
@@ -433,7 +435,7 @@
           <a:p>
             <a:fld id="{846CE7D5-CF57-46EF-B807-FDD0502418D4}" type="datetimeFigureOut">
               <a:rPr lang="en-US" smtClean="0"/>
-              <a:t>3/10/2022</a:t>
+              <a:t>4/4/2022</a:t>
             </a:fld>
             <a:endParaRPr lang="en-US"/>
           </a:p>
@@ -611,7 +613,7 @@
           <a:p>
             <a:fld id="{846CE7D5-CF57-46EF-B807-FDD0502418D4}" type="datetimeFigureOut">
               <a:rPr lang="en-US" smtClean="0"/>
-              <a:t>3/10/2022</a:t>
+              <a:t>4/4/2022</a:t>
             </a:fld>
             <a:endParaRPr lang="en-US"/>
           </a:p>
@@ -779,7 +781,7 @@
           <a:p>
             <a:fld id="{846CE7D5-CF57-46EF-B807-FDD0502418D4}" type="datetimeFigureOut">
               <a:rPr lang="en-US" smtClean="0"/>
-              <a:t>3/10/2022</a:t>
+              <a:t>4/4/2022</a:t>
             </a:fld>
             <a:endParaRPr lang="en-US"/>
           </a:p>
@@ -1024,7 +1026,7 @@
           <a:p>
             <a:fld id="{846CE7D5-CF57-46EF-B807-FDD0502418D4}" type="datetimeFigureOut">
               <a:rPr lang="en-US" smtClean="0"/>
-              <a:t>3/10/2022</a:t>
+              <a:t>4/4/2022</a:t>
             </a:fld>
             <a:endParaRPr lang="en-US"/>
           </a:p>
@@ -1253,7 +1255,7 @@
           <a:p>
             <a:fld id="{846CE7D5-CF57-46EF-B807-FDD0502418D4}" type="datetimeFigureOut">
               <a:rPr lang="en-US" smtClean="0"/>
-              <a:t>3/10/2022</a:t>
+              <a:t>4/4/2022</a:t>
             </a:fld>
             <a:endParaRPr lang="en-US"/>
           </a:p>
@@ -1617,7 +1619,7 @@
           <a:p>
             <a:fld id="{846CE7D5-CF57-46EF-B807-FDD0502418D4}" type="datetimeFigureOut">
               <a:rPr lang="en-US" smtClean="0"/>
-              <a:t>3/10/2022</a:t>
+              <a:t>4/4/2022</a:t>
             </a:fld>
             <a:endParaRPr lang="en-US"/>
           </a:p>
@@ -1734,7 +1736,7 @@
           <a:p>
             <a:fld id="{846CE7D5-CF57-46EF-B807-FDD0502418D4}" type="datetimeFigureOut">
               <a:rPr lang="en-US" smtClean="0"/>
-              <a:t>3/10/2022</a:t>
+              <a:t>4/4/2022</a:t>
             </a:fld>
             <a:endParaRPr lang="en-US"/>
           </a:p>
@@ -1829,7 +1831,7 @@
           <a:p>
             <a:fld id="{846CE7D5-CF57-46EF-B807-FDD0502418D4}" type="datetimeFigureOut">
               <a:rPr lang="en-US" smtClean="0"/>
-              <a:t>3/10/2022</a:t>
+              <a:t>4/4/2022</a:t>
             </a:fld>
             <a:endParaRPr lang="en-US"/>
           </a:p>
@@ -2104,7 +2106,7 @@
           <a:p>
             <a:fld id="{846CE7D5-CF57-46EF-B807-FDD0502418D4}" type="datetimeFigureOut">
               <a:rPr lang="en-US" smtClean="0"/>
-              <a:t>3/10/2022</a:t>
+              <a:t>4/4/2022</a:t>
             </a:fld>
             <a:endParaRPr lang="en-US"/>
           </a:p>
@@ -2359,7 +2361,7 @@
           <a:p>
             <a:fld id="{846CE7D5-CF57-46EF-B807-FDD0502418D4}" type="datetimeFigureOut">
               <a:rPr lang="en-US" smtClean="0"/>
-              <a:t>3/10/2022</a:t>
+              <a:t>4/4/2022</a:t>
             </a:fld>
             <a:endParaRPr lang="en-US"/>
           </a:p>
@@ -2570,7 +2572,7 @@
           <a:p>
             <a:fld id="{846CE7D5-CF57-46EF-B807-FDD0502418D4}" type="datetimeFigureOut">
               <a:rPr lang="en-US" smtClean="0"/>
-              <a:t>3/10/2022</a:t>
+              <a:t>4/4/2022</a:t>
             </a:fld>
             <a:endParaRPr lang="en-US"/>
           </a:p>
@@ -4914,7 +4916,7 @@
                     <a:lstStyle/>
                     <a:p>
                       <a:r>
-                        <a:rPr lang="en-US" dirty="0"/>
+                        <a:rPr lang="en-US"/>
                         <a:t>inventory</a:t>
                       </a:r>
                     </a:p>
@@ -4927,7 +4929,7 @@
                     <a:lstStyle/>
                     <a:p>
                       <a:r>
-                        <a:rPr lang="en-US" dirty="0"/>
+                        <a:rPr lang="en-US"/>
                         <a:t>Datatype</a:t>
                       </a:r>
                     </a:p>
@@ -4947,7 +4949,7 @@
                     <a:lstStyle/>
                     <a:p>
                       <a:r>
-                        <a:rPr lang="en-US" dirty="0"/>
+                        <a:rPr lang="en-US"/>
                         <a:t>IID</a:t>
                       </a:r>
                     </a:p>
@@ -4980,7 +4982,7 @@
                     <a:lstStyle/>
                     <a:p>
                       <a:r>
-                        <a:rPr lang="en-US" dirty="0"/>
+                        <a:rPr lang="en-US"/>
                         <a:t>VID</a:t>
                       </a:r>
                     </a:p>
@@ -5013,7 +5015,7 @@
                     <a:lstStyle/>
                     <a:p>
                       <a:r>
-                        <a:rPr lang="en-US" dirty="0" err="1"/>
+                        <a:rPr lang="en-US" err="1"/>
                         <a:t>item_name</a:t>
                       </a:r>
                     </a:p>
@@ -5026,7 +5028,7 @@
                     <a:lstStyle/>
                     <a:p>
                       <a:r>
-                        <a:rPr lang="en-US" dirty="0"/>
+                        <a:rPr lang="en-US"/>
                         <a:t>varchar(255)</a:t>
                       </a:r>
                     </a:p>
@@ -5046,7 +5048,7 @@
                     <a:lstStyle/>
                     <a:p>
                       <a:r>
-                        <a:rPr lang="en-US" dirty="0" err="1"/>
+                        <a:rPr lang="en-US" err="1"/>
                         <a:t>japanese_item_name</a:t>
                       </a:r>
                     </a:p>
@@ -5059,7 +5061,7 @@
                     <a:lstStyle/>
                     <a:p>
                       <a:r>
-                        <a:rPr lang="en-US" dirty="0"/>
+                        <a:rPr lang="en-US"/>
                         <a:t>varchar(255)</a:t>
                       </a:r>
                     </a:p>
@@ -5079,7 +5081,7 @@
                     <a:lstStyle/>
                     <a:p>
                       <a:r>
-                        <a:rPr lang="en-US" dirty="0" err="1"/>
+                        <a:rPr lang="en-US" err="1"/>
                         <a:t>item_description</a:t>
                       </a:r>
                     </a:p>
@@ -5092,7 +5094,7 @@
                     <a:lstStyle/>
                     <a:p>
                       <a:r>
-                        <a:rPr lang="en-US" dirty="0"/>
+                        <a:rPr lang="en-US"/>
                         <a:t>text</a:t>
                       </a:r>
                     </a:p>
@@ -5112,7 +5114,7 @@
                     <a:lstStyle/>
                     <a:p>
                       <a:r>
-                        <a:rPr lang="en-US" dirty="0" err="1"/>
+                        <a:rPr lang="en-US" err="1"/>
                         <a:t>item_type</a:t>
                       </a:r>
                     </a:p>
@@ -5125,7 +5127,7 @@
                     <a:lstStyle/>
                     <a:p>
                       <a:r>
-                        <a:rPr lang="en-US" dirty="0"/>
+                        <a:rPr lang="en-US"/>
                         <a:t>varchar(255)</a:t>
                       </a:r>
                     </a:p>
@@ -5145,7 +5147,7 @@
                     <a:lstStyle/>
                     <a:p>
                       <a:r>
-                        <a:rPr lang="en-US" dirty="0" err="1"/>
+                        <a:rPr lang="en-US" err="1"/>
                         <a:t>selling_price</a:t>
                       </a:r>
                     </a:p>
@@ -5158,7 +5160,7 @@
                     <a:lstStyle/>
                     <a:p>
                       <a:r>
-                        <a:rPr lang="en-US" dirty="0"/>
+                        <a:rPr lang="en-US"/>
                         <a:t>double(10,2)</a:t>
                       </a:r>
                     </a:p>
@@ -5181,7 +5183,7 @@
                         <a:buNone/>
                       </a:pPr>
                       <a:r>
-                        <a:rPr lang="en-US" dirty="0"/>
+                        <a:rPr lang="en-US"/>
                         <a:t>cost</a:t>
                       </a:r>
                     </a:p>
@@ -5197,7 +5199,7 @@
                         <a:buNone/>
                       </a:pPr>
                       <a:r>
-                        <a:rPr lang="en-US" dirty="0"/>
+                        <a:rPr lang="en-US"/>
                         <a:t>double(10,2)</a:t>
                       </a:r>
                     </a:p>
@@ -5220,7 +5222,7 @@
                         <a:buNone/>
                       </a:pPr>
                       <a:r>
-                        <a:rPr lang="en-US" dirty="0" err="1"/>
+                        <a:rPr lang="en-US" err="1"/>
                         <a:t>in_stock</a:t>
                       </a:r>
                     </a:p>
@@ -5236,7 +5238,7 @@
                         <a:buNone/>
                       </a:pPr>
                       <a:r>
-                        <a:rPr lang="en-US" dirty="0"/>
+                        <a:rPr lang="en-US"/>
                         <a:t>int(11)</a:t>
                       </a:r>
                     </a:p>
@@ -5259,7 +5261,7 @@
                         <a:buNone/>
                       </a:pPr>
                       <a:r>
-                        <a:rPr lang="en-US" dirty="0" err="1"/>
+                        <a:rPr lang="en-US" err="1"/>
                         <a:t>reorder_amount</a:t>
                       </a:r>
                     </a:p>
@@ -5275,7 +5277,7 @@
                         <a:buNone/>
                       </a:pPr>
                       <a:r>
-                        <a:rPr lang="en-US" dirty="0"/>
+                        <a:rPr lang="en-US"/>
                         <a:t>int(11)</a:t>
                       </a:r>
                     </a:p>
@@ -5298,7 +5300,7 @@
                         <a:buNone/>
                       </a:pPr>
                       <a:r>
-                        <a:rPr lang="en-US" dirty="0" err="1"/>
+                        <a:rPr lang="en-US" err="1"/>
                         <a:t>base_stock</a:t>
                       </a:r>
                     </a:p>
@@ -5314,7 +5316,7 @@
                         <a:buNone/>
                       </a:pPr>
                       <a:r>
-                        <a:rPr lang="en-US" dirty="0"/>
+                        <a:rPr lang="en-US"/>
                         <a:t>int(11)</a:t>
                       </a:r>
                     </a:p>
@@ -6092,6 +6094,840 @@
     <p:extLst>
       <p:ext uri="{BB962C8B-B14F-4D97-AF65-F5344CB8AC3E}">
         <p14:creationId xmlns:p14="http://schemas.microsoft.com/office/powerpoint/2010/main" val="3693642849"/>
+      </p:ext>
+    </p:extLst>
+  </p:cSld>
+  <p:clrMapOvr>
+    <a:masterClrMapping/>
+  </p:clrMapOvr>
+</p:sld>
+</file>
+
+<file path=ppt/slides/slide17.xml><?xml version="1.0" encoding="utf-8"?>
+<p:sld xmlns:a="http://schemas.openxmlformats.org/drawingml/2006/main" xmlns:r="http://schemas.openxmlformats.org/officeDocument/2006/relationships" xmlns:p="http://schemas.openxmlformats.org/presentationml/2006/main">
+  <p:cSld>
+    <p:spTree>
+      <p:nvGrpSpPr>
+        <p:cNvPr id="1" name=""/>
+        <p:cNvGrpSpPr/>
+        <p:nvPr/>
+      </p:nvGrpSpPr>
+      <p:grpSpPr>
+        <a:xfrm>
+          <a:off x="0" y="0"/>
+          <a:ext cx="0" cy="0"/>
+          <a:chOff x="0" y="0"/>
+          <a:chExt cx="0" cy="0"/>
+        </a:xfrm>
+      </p:grpSpPr>
+      <p:graphicFrame>
+        <p:nvGraphicFramePr>
+          <p:cNvPr id="2" name="Table 2">
+            <a:extLst>
+              <a:ext uri="{FF2B5EF4-FFF2-40B4-BE49-F238E27FC236}">
+                <a16:creationId xmlns:a16="http://schemas.microsoft.com/office/drawing/2014/main" id="{FFA3AC61-FBBC-2285-8341-945D5CB531D1}"/>
+              </a:ext>
+            </a:extLst>
+          </p:cNvPr>
+          <p:cNvGraphicFramePr>
+            <a:graphicFrameLocks noGrp="1"/>
+          </p:cNvGraphicFramePr>
+          <p:nvPr>
+            <p:extLst>
+              <p:ext uri="{D42A27DB-BD31-4B8C-83A1-F6EECF244321}">
+                <p14:modId xmlns:p14="http://schemas.microsoft.com/office/powerpoint/2010/main" val="1545670676"/>
+              </p:ext>
+            </p:extLst>
+          </p:nvPr>
+        </p:nvGraphicFramePr>
+        <p:xfrm>
+          <a:off x="1262062" y="87312"/>
+          <a:ext cx="10470568" cy="6561466"/>
+        </p:xfrm>
+        <a:graphic>
+          <a:graphicData uri="http://schemas.openxmlformats.org/drawingml/2006/table">
+            <a:tbl>
+              <a:tblPr firstRow="1" bandRow="1">
+                <a:tableStyleId>{5C22544A-7EE6-4342-B048-85BDC9FD1C3A}</a:tableStyleId>
+              </a:tblPr>
+              <a:tblGrid>
+                <a:gridCol w="5222874">
+                  <a:extLst>
+                    <a:ext uri="{9D8B030D-6E8A-4147-A177-3AD203B41FA5}">
+                      <a16:colId xmlns:a16="http://schemas.microsoft.com/office/drawing/2014/main" val="2040065937"/>
+                    </a:ext>
+                  </a:extLst>
+                </a:gridCol>
+                <a:gridCol w="5247694">
+                  <a:extLst>
+                    <a:ext uri="{9D8B030D-6E8A-4147-A177-3AD203B41FA5}">
+                      <a16:colId xmlns:a16="http://schemas.microsoft.com/office/drawing/2014/main" val="1874320758"/>
+                    </a:ext>
+                  </a:extLst>
+                </a:gridCol>
+              </a:tblGrid>
+              <a:tr h="318507">
+                <a:tc>
+                  <a:txBody>
+                    <a:bodyPr/>
+                    <a:lstStyle/>
+                    <a:p>
+                      <a:r>
+                        <a:rPr lang="en-US" dirty="0" err="1"/>
+                        <a:t>profit_loss</a:t>
+                      </a:r>
+                    </a:p>
+                  </a:txBody>
+                  <a:tcPr/>
+                </a:tc>
+                <a:tc>
+                  <a:txBody>
+                    <a:bodyPr/>
+                    <a:lstStyle/>
+                    <a:p>
+                      <a:r>
+                        <a:rPr lang="en-US" dirty="0"/>
+                        <a:t>datatype</a:t>
+                      </a:r>
+                    </a:p>
+                  </a:txBody>
+                  <a:tcPr/>
+                </a:tc>
+                <a:extLst>
+                  <a:ext uri="{0D108BD9-81ED-4DB2-BD59-A6C34878D82A}">
+                    <a16:rowId xmlns:a16="http://schemas.microsoft.com/office/drawing/2014/main" val="2495276249"/>
+                  </a:ext>
+                </a:extLst>
+              </a:tr>
+              <a:tr h="281756">
+                <a:tc>
+                  <a:txBody>
+                    <a:bodyPr/>
+                    <a:lstStyle/>
+                    <a:p>
+                      <a:r>
+                        <a:rPr lang="en-US" dirty="0"/>
+                        <a:t>PLRID</a:t>
+                      </a:r>
+                    </a:p>
+                  </a:txBody>
+                  <a:tcPr/>
+                </a:tc>
+                <a:tc>
+                  <a:txBody>
+                    <a:bodyPr/>
+                    <a:lstStyle/>
+                    <a:p>
+                      <a:r>
+                        <a:rPr lang="en-US" dirty="0"/>
+                        <a:t>int(11)(primary)</a:t>
+                      </a:r>
+                    </a:p>
+                  </a:txBody>
+                  <a:tcPr/>
+                </a:tc>
+                <a:extLst>
+                  <a:ext uri="{0D108BD9-81ED-4DB2-BD59-A6C34878D82A}">
+                    <a16:rowId xmlns:a16="http://schemas.microsoft.com/office/drawing/2014/main" val="2666341794"/>
+                  </a:ext>
+                </a:extLst>
+              </a:tr>
+              <a:tr h="281756">
+                <a:tc>
+                  <a:txBody>
+                    <a:bodyPr/>
+                    <a:lstStyle/>
+                    <a:p>
+                      <a:r>
+                        <a:rPr lang="en-US" dirty="0"/>
+                        <a:t>month</a:t>
+                      </a:r>
+                    </a:p>
+                  </a:txBody>
+                  <a:tcPr/>
+                </a:tc>
+                <a:tc>
+                  <a:txBody>
+                    <a:bodyPr/>
+                    <a:lstStyle/>
+                    <a:p>
+                      <a:r>
+                        <a:rPr lang="en-US" dirty="0"/>
+                        <a:t>varchar(20)</a:t>
+                      </a:r>
+                    </a:p>
+                  </a:txBody>
+                  <a:tcPr/>
+                </a:tc>
+                <a:extLst>
+                  <a:ext uri="{0D108BD9-81ED-4DB2-BD59-A6C34878D82A}">
+                    <a16:rowId xmlns:a16="http://schemas.microsoft.com/office/drawing/2014/main" val="2871256526"/>
+                  </a:ext>
+                </a:extLst>
+              </a:tr>
+              <a:tr h="490012">
+                <a:tc>
+                  <a:txBody>
+                    <a:bodyPr/>
+                    <a:lstStyle/>
+                    <a:p>
+                      <a:r>
+                        <a:rPr lang="en-US" dirty="0"/>
+                        <a:t>year</a:t>
+                      </a:r>
+                    </a:p>
+                  </a:txBody>
+                  <a:tcPr/>
+                </a:tc>
+                <a:tc>
+                  <a:txBody>
+                    <a:bodyPr/>
+                    <a:lstStyle/>
+                    <a:p>
+                      <a:pPr lvl="0" algn="l">
+                        <a:lnSpc>
+                          <a:spcPct val="100000"/>
+                        </a:lnSpc>
+                        <a:spcBef>
+                          <a:spcPts val="0"/>
+                        </a:spcBef>
+                        <a:spcAft>
+                          <a:spcPts val="0"/>
+                        </a:spcAft>
+                        <a:buNone/>
+                      </a:pPr>
+                      <a:r>
+                        <a:rPr lang="en-US" sz="1800" b="0" i="0" u="none" strike="noStrike" noProof="0" dirty="0">
+                          <a:latin typeface="Calibri"/>
+                        </a:rPr>
+                        <a:t>int(11)</a:t>
+                      </a:r>
+                      <a:endParaRPr lang="en-US" dirty="0"/>
+                    </a:p>
+                    <a:p>
+                      <a:pPr lvl="0">
+                        <a:buNone/>
+                      </a:pPr>
+                      <a:endParaRPr lang="en-US" dirty="0"/>
+                    </a:p>
+                  </a:txBody>
+                  <a:tcPr/>
+                </a:tc>
+                <a:extLst>
+                  <a:ext uri="{0D108BD9-81ED-4DB2-BD59-A6C34878D82A}">
+                    <a16:rowId xmlns:a16="http://schemas.microsoft.com/office/drawing/2014/main" val="2814231431"/>
+                  </a:ext>
+                </a:extLst>
+              </a:tr>
+              <a:tr h="490012">
+                <a:tc>
+                  <a:txBody>
+                    <a:bodyPr/>
+                    <a:lstStyle/>
+                    <a:p>
+                      <a:r>
+                        <a:rPr lang="en-US" dirty="0"/>
+                        <a:t> </a:t>
+                      </a:r>
+                      <a:r>
+                        <a:rPr lang="en-US" sz="1800" b="0" i="0" u="none" strike="noStrike" noProof="0" dirty="0" err="1">
+                          <a:latin typeface="Calibri"/>
+                        </a:rPr>
+                        <a:t>net_sales</a:t>
+                      </a:r>
+                      <a:endParaRPr lang="en-US" dirty="0" err="1"/>
+                    </a:p>
+                    <a:p>
+                      <a:pPr lvl="0">
+                        <a:buNone/>
+                      </a:pPr>
+                      <a:endParaRPr lang="en-US" dirty="0"/>
+                    </a:p>
+                  </a:txBody>
+                  <a:tcPr/>
+                </a:tc>
+                <a:tc>
+                  <a:txBody>
+                    <a:bodyPr/>
+                    <a:lstStyle/>
+                    <a:p>
+                      <a:pPr lvl="0" algn="l">
+                        <a:lnSpc>
+                          <a:spcPct val="100000"/>
+                        </a:lnSpc>
+                        <a:spcBef>
+                          <a:spcPts val="0"/>
+                        </a:spcBef>
+                        <a:spcAft>
+                          <a:spcPts val="0"/>
+                        </a:spcAft>
+                        <a:buNone/>
+                      </a:pPr>
+                      <a:r>
+                        <a:rPr lang="en-US" sz="1800" b="0" i="0" u="none" strike="noStrike" noProof="0" dirty="0">
+                          <a:latin typeface="Calibri"/>
+                        </a:rPr>
+                        <a:t>double(10,2)</a:t>
+                      </a:r>
+                      <a:endParaRPr lang="en-US" dirty="0"/>
+                    </a:p>
+                  </a:txBody>
+                  <a:tcPr/>
+                </a:tc>
+                <a:extLst>
+                  <a:ext uri="{0D108BD9-81ED-4DB2-BD59-A6C34878D82A}">
+                    <a16:rowId xmlns:a16="http://schemas.microsoft.com/office/drawing/2014/main" val="3101541317"/>
+                  </a:ext>
+                </a:extLst>
+              </a:tr>
+              <a:tr h="490012">
+                <a:tc>
+                  <a:txBody>
+                    <a:bodyPr/>
+                    <a:lstStyle/>
+                    <a:p>
+                      <a:pPr lvl="0" algn="l">
+                        <a:lnSpc>
+                          <a:spcPct val="100000"/>
+                        </a:lnSpc>
+                        <a:spcBef>
+                          <a:spcPts val="0"/>
+                        </a:spcBef>
+                        <a:spcAft>
+                          <a:spcPts val="0"/>
+                        </a:spcAft>
+                        <a:buNone/>
+                      </a:pPr>
+                      <a:r>
+                        <a:rPr lang="en-US" sz="1800" b="0" i="0" u="none" strike="noStrike" noProof="0" dirty="0" err="1">
+                          <a:latin typeface="Calibri"/>
+                        </a:rPr>
+                        <a:t>cost_of_goods</a:t>
+                      </a:r>
+                      <a:endParaRPr lang="en-US" dirty="0" err="1"/>
+                    </a:p>
+                    <a:p>
+                      <a:pPr lvl="0">
+                        <a:buNone/>
+                      </a:pPr>
+                      <a:endParaRPr lang="en-US" dirty="0"/>
+                    </a:p>
+                  </a:txBody>
+                  <a:tcPr/>
+                </a:tc>
+                <a:tc>
+                  <a:txBody>
+                    <a:bodyPr/>
+                    <a:lstStyle/>
+                    <a:p>
+                      <a:pPr lvl="0" algn="l">
+                        <a:lnSpc>
+                          <a:spcPct val="100000"/>
+                        </a:lnSpc>
+                        <a:spcBef>
+                          <a:spcPts val="0"/>
+                        </a:spcBef>
+                        <a:spcAft>
+                          <a:spcPts val="0"/>
+                        </a:spcAft>
+                        <a:buNone/>
+                      </a:pPr>
+                      <a:r>
+                        <a:rPr lang="en-US" sz="1800" b="0" i="0" u="none" strike="noStrike" noProof="0" dirty="0">
+                          <a:latin typeface="Calibri"/>
+                        </a:rPr>
+                        <a:t>double(10,2)</a:t>
+                      </a:r>
+                      <a:endParaRPr lang="en-US" dirty="0"/>
+                    </a:p>
+                    <a:p>
+                      <a:pPr lvl="0">
+                        <a:buNone/>
+                      </a:pPr>
+                      <a:endParaRPr lang="en-US" dirty="0"/>
+                    </a:p>
+                  </a:txBody>
+                  <a:tcPr/>
+                </a:tc>
+                <a:extLst>
+                  <a:ext uri="{0D108BD9-81ED-4DB2-BD59-A6C34878D82A}">
+                    <a16:rowId xmlns:a16="http://schemas.microsoft.com/office/drawing/2014/main" val="4025365335"/>
+                  </a:ext>
+                </a:extLst>
+              </a:tr>
+              <a:tr h="490012">
+                <a:tc>
+                  <a:txBody>
+                    <a:bodyPr/>
+                    <a:lstStyle/>
+                    <a:p>
+                      <a:pPr lvl="0" algn="l">
+                        <a:lnSpc>
+                          <a:spcPct val="100000"/>
+                        </a:lnSpc>
+                        <a:spcBef>
+                          <a:spcPts val="0"/>
+                        </a:spcBef>
+                        <a:spcAft>
+                          <a:spcPts val="0"/>
+                        </a:spcAft>
+                        <a:buNone/>
+                      </a:pPr>
+                      <a:r>
+                        <a:rPr lang="en-US" sz="1800" b="0" i="0" u="none" strike="noStrike" noProof="0" dirty="0" err="1">
+                          <a:latin typeface="Calibri"/>
+                        </a:rPr>
+                        <a:t>gross_profit</a:t>
+                      </a:r>
+                      <a:endParaRPr lang="en-US" dirty="0" err="1"/>
+                    </a:p>
+                    <a:p>
+                      <a:pPr lvl="0">
+                        <a:buNone/>
+                      </a:pPr>
+                      <a:endParaRPr lang="en-US" dirty="0"/>
+                    </a:p>
+                  </a:txBody>
+                  <a:tcPr/>
+                </a:tc>
+                <a:tc>
+                  <a:txBody>
+                    <a:bodyPr/>
+                    <a:lstStyle/>
+                    <a:p>
+                      <a:pPr lvl="0" algn="l">
+                        <a:lnSpc>
+                          <a:spcPct val="100000"/>
+                        </a:lnSpc>
+                        <a:spcBef>
+                          <a:spcPts val="0"/>
+                        </a:spcBef>
+                        <a:spcAft>
+                          <a:spcPts val="0"/>
+                        </a:spcAft>
+                        <a:buNone/>
+                      </a:pPr>
+                      <a:r>
+                        <a:rPr lang="en-US" sz="1800" b="0" i="0" u="none" strike="noStrike" noProof="0" dirty="0">
+                          <a:latin typeface="Calibri"/>
+                        </a:rPr>
+                        <a:t>double(10,2)</a:t>
+                      </a:r>
+                      <a:endParaRPr lang="en-US" dirty="0"/>
+                    </a:p>
+                    <a:p>
+                      <a:pPr lvl="0">
+                        <a:buNone/>
+                      </a:pPr>
+                      <a:endParaRPr lang="en-US" dirty="0"/>
+                    </a:p>
+                  </a:txBody>
+                  <a:tcPr/>
+                </a:tc>
+                <a:extLst>
+                  <a:ext uri="{0D108BD9-81ED-4DB2-BD59-A6C34878D82A}">
+                    <a16:rowId xmlns:a16="http://schemas.microsoft.com/office/drawing/2014/main" val="1399531811"/>
+                  </a:ext>
+                </a:extLst>
+              </a:tr>
+              <a:tr h="381000">
+                <a:tc>
+                  <a:txBody>
+                    <a:bodyPr/>
+                    <a:lstStyle/>
+                    <a:p>
+                      <a:pPr lvl="0" algn="l">
+                        <a:lnSpc>
+                          <a:spcPct val="100000"/>
+                        </a:lnSpc>
+                        <a:spcBef>
+                          <a:spcPts val="0"/>
+                        </a:spcBef>
+                        <a:spcAft>
+                          <a:spcPts val="0"/>
+                        </a:spcAft>
+                        <a:buNone/>
+                      </a:pPr>
+                      <a:r>
+                        <a:rPr lang="en-US" sz="1800" b="0" i="0" u="none" strike="noStrike" noProof="0" dirty="0">
+                          <a:latin typeface="Calibri"/>
+                        </a:rPr>
+                        <a:t>salary</a:t>
+                      </a:r>
+                      <a:endParaRPr lang="en-US" dirty="0"/>
+                    </a:p>
+                  </a:txBody>
+                  <a:tcPr/>
+                </a:tc>
+                <a:tc>
+                  <a:txBody>
+                    <a:bodyPr/>
+                    <a:lstStyle/>
+                    <a:p>
+                      <a:pPr lvl="0" algn="l">
+                        <a:lnSpc>
+                          <a:spcPct val="100000"/>
+                        </a:lnSpc>
+                        <a:spcBef>
+                          <a:spcPts val="0"/>
+                        </a:spcBef>
+                        <a:spcAft>
+                          <a:spcPts val="0"/>
+                        </a:spcAft>
+                        <a:buNone/>
+                      </a:pPr>
+                      <a:r>
+                        <a:rPr lang="en-US" sz="1800" b="0" i="0" u="none" strike="noStrike" noProof="0" dirty="0">
+                          <a:latin typeface="Calibri"/>
+                        </a:rPr>
+                        <a:t>double(10,2)</a:t>
+                      </a:r>
+                      <a:endParaRPr lang="en-US" dirty="0"/>
+                    </a:p>
+                  </a:txBody>
+                  <a:tcPr/>
+                </a:tc>
+                <a:extLst>
+                  <a:ext uri="{0D108BD9-81ED-4DB2-BD59-A6C34878D82A}">
+                    <a16:rowId xmlns:a16="http://schemas.microsoft.com/office/drawing/2014/main" val="3457950196"/>
+                  </a:ext>
+                </a:extLst>
+              </a:tr>
+              <a:tr h="635000">
+                <a:tc>
+                  <a:txBody>
+                    <a:bodyPr/>
+                    <a:lstStyle/>
+                    <a:p>
+                      <a:pPr lvl="0" algn="l">
+                        <a:lnSpc>
+                          <a:spcPct val="100000"/>
+                        </a:lnSpc>
+                        <a:spcBef>
+                          <a:spcPts val="0"/>
+                        </a:spcBef>
+                        <a:spcAft>
+                          <a:spcPts val="0"/>
+                        </a:spcAft>
+                        <a:buNone/>
+                      </a:pPr>
+                      <a:r>
+                        <a:rPr lang="en-US" sz="1800" b="0" i="0" u="none" strike="noStrike" noProof="0" dirty="0">
+                          <a:latin typeface="Calibri"/>
+                        </a:rPr>
+                        <a:t>utilities</a:t>
+                      </a:r>
+                      <a:endParaRPr lang="en-US" dirty="0"/>
+                    </a:p>
+                    <a:p>
+                      <a:pPr lvl="0">
+                        <a:buNone/>
+                      </a:pPr>
+                      <a:endParaRPr lang="en-US" dirty="0"/>
+                    </a:p>
+                  </a:txBody>
+                  <a:tcPr/>
+                </a:tc>
+                <a:tc>
+                  <a:txBody>
+                    <a:bodyPr/>
+                    <a:lstStyle/>
+                    <a:p>
+                      <a:pPr lvl="0" algn="l">
+                        <a:lnSpc>
+                          <a:spcPct val="100000"/>
+                        </a:lnSpc>
+                        <a:spcBef>
+                          <a:spcPts val="0"/>
+                        </a:spcBef>
+                        <a:spcAft>
+                          <a:spcPts val="0"/>
+                        </a:spcAft>
+                        <a:buNone/>
+                      </a:pPr>
+                      <a:r>
+                        <a:rPr lang="en-US" sz="1800" b="0" i="0" u="none" strike="noStrike" noProof="0" dirty="0">
+                          <a:latin typeface="Calibri"/>
+                        </a:rPr>
+                        <a:t>double(10,2)</a:t>
+                      </a:r>
+                      <a:endParaRPr lang="en-US" dirty="0"/>
+                    </a:p>
+                    <a:p>
+                      <a:pPr lvl="0">
+                        <a:buNone/>
+                      </a:pPr>
+                      <a:endParaRPr lang="en-US" dirty="0"/>
+                    </a:p>
+                  </a:txBody>
+                  <a:tcPr/>
+                </a:tc>
+                <a:extLst>
+                  <a:ext uri="{0D108BD9-81ED-4DB2-BD59-A6C34878D82A}">
+                    <a16:rowId xmlns:a16="http://schemas.microsoft.com/office/drawing/2014/main" val="1519526604"/>
+                  </a:ext>
+                </a:extLst>
+              </a:tr>
+              <a:tr h="412750">
+                <a:tc>
+                  <a:txBody>
+                    <a:bodyPr/>
+                    <a:lstStyle/>
+                    <a:p>
+                      <a:pPr lvl="0" algn="l">
+                        <a:lnSpc>
+                          <a:spcPct val="100000"/>
+                        </a:lnSpc>
+                        <a:spcBef>
+                          <a:spcPts val="0"/>
+                        </a:spcBef>
+                        <a:spcAft>
+                          <a:spcPts val="0"/>
+                        </a:spcAft>
+                        <a:buNone/>
+                      </a:pPr>
+                      <a:r>
+                        <a:rPr lang="en-US" sz="1800" b="0" i="0" u="none" strike="noStrike" noProof="0" dirty="0">
+                          <a:latin typeface="Calibri"/>
+                        </a:rPr>
+                        <a:t>rent</a:t>
+                      </a:r>
+                      <a:endParaRPr lang="en-US" dirty="0"/>
+                    </a:p>
+                  </a:txBody>
+                  <a:tcPr/>
+                </a:tc>
+                <a:tc>
+                  <a:txBody>
+                    <a:bodyPr/>
+                    <a:lstStyle/>
+                    <a:p>
+                      <a:pPr lvl="0" algn="l">
+                        <a:lnSpc>
+                          <a:spcPct val="100000"/>
+                        </a:lnSpc>
+                        <a:spcBef>
+                          <a:spcPts val="0"/>
+                        </a:spcBef>
+                        <a:spcAft>
+                          <a:spcPts val="0"/>
+                        </a:spcAft>
+                        <a:buNone/>
+                      </a:pPr>
+                      <a:r>
+                        <a:rPr lang="en-US" sz="1800" b="0" i="0" u="none" strike="noStrike" noProof="0" dirty="0">
+                          <a:latin typeface="Calibri"/>
+                        </a:rPr>
+                        <a:t>double(10,2)</a:t>
+                      </a:r>
+                      <a:endParaRPr lang="en-US" dirty="0"/>
+                    </a:p>
+                  </a:txBody>
+                  <a:tcPr/>
+                </a:tc>
+                <a:extLst>
+                  <a:ext uri="{0D108BD9-81ED-4DB2-BD59-A6C34878D82A}">
+                    <a16:rowId xmlns:a16="http://schemas.microsoft.com/office/drawing/2014/main" val="22533653"/>
+                  </a:ext>
+                </a:extLst>
+              </a:tr>
+              <a:tr h="490012">
+                <a:tc>
+                  <a:txBody>
+                    <a:bodyPr/>
+                    <a:lstStyle/>
+                    <a:p>
+                      <a:pPr lvl="0" algn="l">
+                        <a:lnSpc>
+                          <a:spcPct val="100000"/>
+                        </a:lnSpc>
+                        <a:spcBef>
+                          <a:spcPts val="0"/>
+                        </a:spcBef>
+                        <a:spcAft>
+                          <a:spcPts val="0"/>
+                        </a:spcAft>
+                        <a:buNone/>
+                      </a:pPr>
+                      <a:r>
+                        <a:rPr lang="en-US" sz="1800" b="0" i="0" u="none" strike="noStrike" noProof="0" dirty="0" err="1">
+                          <a:latin typeface="Calibri"/>
+                        </a:rPr>
+                        <a:t>other_expenses</a:t>
+                      </a:r>
+                      <a:endParaRPr lang="en-US" dirty="0" err="1"/>
+                    </a:p>
+                  </a:txBody>
+                  <a:tcPr/>
+                </a:tc>
+                <a:tc>
+                  <a:txBody>
+                    <a:bodyPr/>
+                    <a:lstStyle/>
+                    <a:p>
+                      <a:pPr lvl="0" algn="l">
+                        <a:lnSpc>
+                          <a:spcPct val="100000"/>
+                        </a:lnSpc>
+                        <a:spcBef>
+                          <a:spcPts val="0"/>
+                        </a:spcBef>
+                        <a:spcAft>
+                          <a:spcPts val="0"/>
+                        </a:spcAft>
+                        <a:buNone/>
+                      </a:pPr>
+                      <a:r>
+                        <a:rPr lang="en-US" sz="1800" b="0" i="0" u="none" strike="noStrike" noProof="0" dirty="0">
+                          <a:latin typeface="Calibri"/>
+                        </a:rPr>
+                        <a:t>double(10,2)</a:t>
+                      </a:r>
+                      <a:endParaRPr lang="en-US" dirty="0"/>
+                    </a:p>
+                  </a:txBody>
+                  <a:tcPr/>
+                </a:tc>
+                <a:extLst>
+                  <a:ext uri="{0D108BD9-81ED-4DB2-BD59-A6C34878D82A}">
+                    <a16:rowId xmlns:a16="http://schemas.microsoft.com/office/drawing/2014/main" val="3242785995"/>
+                  </a:ext>
+                </a:extLst>
+              </a:tr>
+              <a:tr h="490012">
+                <a:tc>
+                  <a:txBody>
+                    <a:bodyPr/>
+                    <a:lstStyle/>
+                    <a:p>
+                      <a:pPr lvl="0" algn="l">
+                        <a:lnSpc>
+                          <a:spcPct val="100000"/>
+                        </a:lnSpc>
+                        <a:spcBef>
+                          <a:spcPts val="0"/>
+                        </a:spcBef>
+                        <a:spcAft>
+                          <a:spcPts val="0"/>
+                        </a:spcAft>
+                        <a:buNone/>
+                      </a:pPr>
+                      <a:r>
+                        <a:rPr lang="en-US" sz="1800" b="0" i="0" u="none" strike="noStrike" noProof="0" dirty="0" err="1">
+                          <a:latin typeface="Calibri"/>
+                        </a:rPr>
+                        <a:t>total_expenses</a:t>
+                      </a:r>
+                      <a:endParaRPr lang="en-US" dirty="0" err="1"/>
+                    </a:p>
+                  </a:txBody>
+                  <a:tcPr/>
+                </a:tc>
+                <a:tc>
+                  <a:txBody>
+                    <a:bodyPr/>
+                    <a:lstStyle/>
+                    <a:p>
+                      <a:pPr lvl="0" algn="l">
+                        <a:lnSpc>
+                          <a:spcPct val="100000"/>
+                        </a:lnSpc>
+                        <a:spcBef>
+                          <a:spcPts val="0"/>
+                        </a:spcBef>
+                        <a:spcAft>
+                          <a:spcPts val="0"/>
+                        </a:spcAft>
+                        <a:buNone/>
+                      </a:pPr>
+                      <a:r>
+                        <a:rPr lang="en-US" sz="1800" b="0" i="0" u="none" strike="noStrike" noProof="0" dirty="0">
+                          <a:latin typeface="Calibri"/>
+                        </a:rPr>
+                        <a:t>double(10,2)</a:t>
+                      </a:r>
+                      <a:endParaRPr lang="en-US" dirty="0"/>
+                    </a:p>
+                  </a:txBody>
+                  <a:tcPr/>
+                </a:tc>
+                <a:extLst>
+                  <a:ext uri="{0D108BD9-81ED-4DB2-BD59-A6C34878D82A}">
+                    <a16:rowId xmlns:a16="http://schemas.microsoft.com/office/drawing/2014/main" val="2470746229"/>
+                  </a:ext>
+                </a:extLst>
+              </a:tr>
+              <a:tr h="490012">
+                <a:tc>
+                  <a:txBody>
+                    <a:bodyPr/>
+                    <a:lstStyle/>
+                    <a:p>
+                      <a:pPr lvl="0" algn="l">
+                        <a:lnSpc>
+                          <a:spcPct val="100000"/>
+                        </a:lnSpc>
+                        <a:spcBef>
+                          <a:spcPts val="0"/>
+                        </a:spcBef>
+                        <a:spcAft>
+                          <a:spcPts val="0"/>
+                        </a:spcAft>
+                        <a:buNone/>
+                      </a:pPr>
+                      <a:r>
+                        <a:rPr lang="en-US" sz="1800" b="0" i="0" u="none" strike="noStrike" noProof="0" dirty="0" err="1">
+                          <a:latin typeface="Calibri"/>
+                        </a:rPr>
+                        <a:t>net_income</a:t>
+                      </a:r>
+                      <a:endParaRPr lang="en-US" dirty="0" err="1"/>
+                    </a:p>
+                  </a:txBody>
+                  <a:tcPr/>
+                </a:tc>
+                <a:tc>
+                  <a:txBody>
+                    <a:bodyPr/>
+                    <a:lstStyle/>
+                    <a:p>
+                      <a:pPr lvl="0" algn="l">
+                        <a:lnSpc>
+                          <a:spcPct val="100000"/>
+                        </a:lnSpc>
+                        <a:spcBef>
+                          <a:spcPts val="0"/>
+                        </a:spcBef>
+                        <a:spcAft>
+                          <a:spcPts val="0"/>
+                        </a:spcAft>
+                        <a:buNone/>
+                      </a:pPr>
+                      <a:r>
+                        <a:rPr lang="en-US" sz="1800" b="0" i="0" u="none" strike="noStrike" noProof="0" dirty="0">
+                          <a:latin typeface="Calibri"/>
+                        </a:rPr>
+                        <a:t>double(10,2)</a:t>
+                      </a:r>
+                      <a:endParaRPr lang="en-US" dirty="0"/>
+                    </a:p>
+                  </a:txBody>
+                  <a:tcPr/>
+                </a:tc>
+                <a:extLst>
+                  <a:ext uri="{0D108BD9-81ED-4DB2-BD59-A6C34878D82A}">
+                    <a16:rowId xmlns:a16="http://schemas.microsoft.com/office/drawing/2014/main" val="4238099178"/>
+                  </a:ext>
+                </a:extLst>
+              </a:tr>
+            </a:tbl>
+          </a:graphicData>
+        </a:graphic>
+      </p:graphicFrame>
+    </p:spTree>
+    <p:extLst>
+      <p:ext uri="{BB962C8B-B14F-4D97-AF65-F5344CB8AC3E}">
+        <p14:creationId xmlns:p14="http://schemas.microsoft.com/office/powerpoint/2010/main" val="133761935"/>
       </p:ext>
     </p:extLst>
   </p:cSld>

</xml_diff>